<commit_message>
small changes + added consumer mockup
</commit_message>
<xml_diff>
--- a/Project/doc/Documentatie Sam/Mockups - Designs - Manuals/Consumer/Mockups/lvl_consumer_ui_template.pptx
+++ b/Project/doc/Documentatie Sam/Mockups - Designs - Manuals/Consumer/Mockups/lvl_consumer_ui_template.pptx
@@ -261,7 +261,7 @@
           <a:p>
             <a:fld id="{CE1695FB-F0E8-4FAE-A24C-33DD78ED6401}" type="datetimeFigureOut">
               <a:rPr lang="nl-BE" smtClean="0"/>
-              <a:t>6/02/2019</a:t>
+              <a:t>4/03/2019</a:t>
             </a:fld>
             <a:endParaRPr lang="nl-BE"/>
           </a:p>
@@ -461,7 +461,7 @@
           <a:p>
             <a:fld id="{CE1695FB-F0E8-4FAE-A24C-33DD78ED6401}" type="datetimeFigureOut">
               <a:rPr lang="nl-BE" smtClean="0"/>
-              <a:t>6/02/2019</a:t>
+              <a:t>4/03/2019</a:t>
             </a:fld>
             <a:endParaRPr lang="nl-BE"/>
           </a:p>
@@ -671,7 +671,7 @@
           <a:p>
             <a:fld id="{CE1695FB-F0E8-4FAE-A24C-33DD78ED6401}" type="datetimeFigureOut">
               <a:rPr lang="nl-BE" smtClean="0"/>
-              <a:t>6/02/2019</a:t>
+              <a:t>4/03/2019</a:t>
             </a:fld>
             <a:endParaRPr lang="nl-BE"/>
           </a:p>
@@ -871,7 +871,7 @@
           <a:p>
             <a:fld id="{CE1695FB-F0E8-4FAE-A24C-33DD78ED6401}" type="datetimeFigureOut">
               <a:rPr lang="nl-BE" smtClean="0"/>
-              <a:t>6/02/2019</a:t>
+              <a:t>4/03/2019</a:t>
             </a:fld>
             <a:endParaRPr lang="nl-BE"/>
           </a:p>
@@ -1147,7 +1147,7 @@
           <a:p>
             <a:fld id="{CE1695FB-F0E8-4FAE-A24C-33DD78ED6401}" type="datetimeFigureOut">
               <a:rPr lang="nl-BE" smtClean="0"/>
-              <a:t>6/02/2019</a:t>
+              <a:t>4/03/2019</a:t>
             </a:fld>
             <a:endParaRPr lang="nl-BE"/>
           </a:p>
@@ -1415,7 +1415,7 @@
           <a:p>
             <a:fld id="{CE1695FB-F0E8-4FAE-A24C-33DD78ED6401}" type="datetimeFigureOut">
               <a:rPr lang="nl-BE" smtClean="0"/>
-              <a:t>6/02/2019</a:t>
+              <a:t>4/03/2019</a:t>
             </a:fld>
             <a:endParaRPr lang="nl-BE"/>
           </a:p>
@@ -1830,7 +1830,7 @@
           <a:p>
             <a:fld id="{CE1695FB-F0E8-4FAE-A24C-33DD78ED6401}" type="datetimeFigureOut">
               <a:rPr lang="nl-BE" smtClean="0"/>
-              <a:t>6/02/2019</a:t>
+              <a:t>4/03/2019</a:t>
             </a:fld>
             <a:endParaRPr lang="nl-BE"/>
           </a:p>
@@ -1972,7 +1972,7 @@
           <a:p>
             <a:fld id="{CE1695FB-F0E8-4FAE-A24C-33DD78ED6401}" type="datetimeFigureOut">
               <a:rPr lang="nl-BE" smtClean="0"/>
-              <a:t>6/02/2019</a:t>
+              <a:t>4/03/2019</a:t>
             </a:fld>
             <a:endParaRPr lang="nl-BE"/>
           </a:p>
@@ -2085,7 +2085,7 @@
           <a:p>
             <a:fld id="{CE1695FB-F0E8-4FAE-A24C-33DD78ED6401}" type="datetimeFigureOut">
               <a:rPr lang="nl-BE" smtClean="0"/>
-              <a:t>6/02/2019</a:t>
+              <a:t>4/03/2019</a:t>
             </a:fld>
             <a:endParaRPr lang="nl-BE"/>
           </a:p>
@@ -2398,7 +2398,7 @@
           <a:p>
             <a:fld id="{CE1695FB-F0E8-4FAE-A24C-33DD78ED6401}" type="datetimeFigureOut">
               <a:rPr lang="nl-BE" smtClean="0"/>
-              <a:t>6/02/2019</a:t>
+              <a:t>4/03/2019</a:t>
             </a:fld>
             <a:endParaRPr lang="nl-BE"/>
           </a:p>
@@ -2687,7 +2687,7 @@
           <a:p>
             <a:fld id="{CE1695FB-F0E8-4FAE-A24C-33DD78ED6401}" type="datetimeFigureOut">
               <a:rPr lang="nl-BE" smtClean="0"/>
-              <a:t>6/02/2019</a:t>
+              <a:t>4/03/2019</a:t>
             </a:fld>
             <a:endParaRPr lang="nl-BE"/>
           </a:p>
@@ -2930,7 +2930,7 @@
           <a:p>
             <a:fld id="{CE1695FB-F0E8-4FAE-A24C-33DD78ED6401}" type="datetimeFigureOut">
               <a:rPr lang="nl-BE" smtClean="0"/>
-              <a:t>6/02/2019</a:t>
+              <a:t>4/03/2019</a:t>
             </a:fld>
             <a:endParaRPr lang="nl-BE"/>
           </a:p>
@@ -3412,7 +3412,7 @@
           <p:nvPr/>
         </p:nvPicPr>
         <p:blipFill>
-          <a:blip r:embed="rId2">
+          <a:blip r:embed="rId3">
             <a:extLst>
               <a:ext uri="{28A0092B-C50C-407E-A947-70E740481C1C}">
                 <a14:useLocalDpi xmlns:a14="http://schemas.microsoft.com/office/drawing/2010/main" val="0"/>
@@ -3425,12 +3425,15 @@
         </p:blipFill>
         <p:spPr>
           <a:xfrm>
-            <a:off x="0" y="0"/>
+            <a:off x="0" y="-7325"/>
             <a:ext cx="12192000" cy="6858000"/>
           </a:xfrm>
           <a:prstGeom prst="rect">
             <a:avLst/>
           </a:prstGeom>
+          <a:solidFill>
+            <a:schemeClr val="accent1"/>
+          </a:solidFill>
         </p:spPr>
       </p:pic>
       <p:sp>
@@ -3468,6 +3471,906 @@
               <a:rPr lang="nl-BE" dirty="0"/>
               <a:t>Player: Sam Score: 500 </a:t>
             </a:r>
+          </a:p>
+        </p:txBody>
+      </p:sp>
+      <p:sp>
+        <p:nvSpPr>
+          <p:cNvPr id="4" name="Rectangle 3">
+            <a:extLst>
+              <a:ext uri="{FF2B5EF4-FFF2-40B4-BE49-F238E27FC236}">
+                <a16:creationId xmlns:a16="http://schemas.microsoft.com/office/drawing/2014/main" id="{60B5CB5D-E3DB-4D2A-AE01-CC1536466B33}"/>
+              </a:ext>
+            </a:extLst>
+          </p:cNvPr>
+          <p:cNvSpPr/>
+          <p:nvPr/>
+        </p:nvSpPr>
+        <p:spPr>
+          <a:xfrm>
+            <a:off x="134224" y="3363985"/>
+            <a:ext cx="2499919" cy="3305263"/>
+          </a:xfrm>
+          <a:prstGeom prst="rect">
+            <a:avLst/>
+          </a:prstGeom>
+        </p:spPr>
+        <p:style>
+          <a:lnRef idx="2">
+            <a:schemeClr val="accent1">
+              <a:shade val="50000"/>
+            </a:schemeClr>
+          </a:lnRef>
+          <a:fillRef idx="1">
+            <a:schemeClr val="accent1"/>
+          </a:fillRef>
+          <a:effectRef idx="0">
+            <a:schemeClr val="accent1"/>
+          </a:effectRef>
+          <a:fontRef idx="minor">
+            <a:schemeClr val="lt1"/>
+          </a:fontRef>
+        </p:style>
+        <p:txBody>
+          <a:bodyPr rtlCol="0" anchor="ctr"/>
+          <a:lstStyle/>
+          <a:p>
+            <a:pPr algn="ctr"/>
+            <a:endParaRPr lang="nl-BE" dirty="0"/>
+          </a:p>
+        </p:txBody>
+      </p:sp>
+      <p:sp>
+        <p:nvSpPr>
+          <p:cNvPr id="7" name="Rectangle 6">
+            <a:extLst>
+              <a:ext uri="{FF2B5EF4-FFF2-40B4-BE49-F238E27FC236}">
+                <a16:creationId xmlns:a16="http://schemas.microsoft.com/office/drawing/2014/main" id="{43D20C88-5A4C-4A60-B3D7-B7FBDC459A4E}"/>
+              </a:ext>
+            </a:extLst>
+          </p:cNvPr>
+          <p:cNvSpPr/>
+          <p:nvPr/>
+        </p:nvSpPr>
+        <p:spPr>
+          <a:xfrm>
+            <a:off x="324373" y="3754073"/>
+            <a:ext cx="394282" cy="2525086"/>
+          </a:xfrm>
+          <a:prstGeom prst="rect">
+            <a:avLst/>
+          </a:prstGeom>
+          <a:solidFill>
+            <a:schemeClr val="accent6"/>
+          </a:solidFill>
+        </p:spPr>
+        <p:style>
+          <a:lnRef idx="2">
+            <a:schemeClr val="accent1">
+              <a:shade val="50000"/>
+            </a:schemeClr>
+          </a:lnRef>
+          <a:fillRef idx="1">
+            <a:schemeClr val="accent1"/>
+          </a:fillRef>
+          <a:effectRef idx="0">
+            <a:schemeClr val="accent1"/>
+          </a:effectRef>
+          <a:fontRef idx="minor">
+            <a:schemeClr val="lt1"/>
+          </a:fontRef>
+        </p:style>
+        <p:txBody>
+          <a:bodyPr rtlCol="0" anchor="ctr"/>
+          <a:lstStyle/>
+          <a:p>
+            <a:pPr algn="ctr"/>
+            <a:endParaRPr lang="nl-BE"/>
+          </a:p>
+        </p:txBody>
+      </p:sp>
+      <p:sp>
+        <p:nvSpPr>
+          <p:cNvPr id="8" name="Rectangle 7">
+            <a:extLst>
+              <a:ext uri="{FF2B5EF4-FFF2-40B4-BE49-F238E27FC236}">
+                <a16:creationId xmlns:a16="http://schemas.microsoft.com/office/drawing/2014/main" id="{D9D7FF09-E192-4F68-884B-D824E25942CD}"/>
+              </a:ext>
+            </a:extLst>
+          </p:cNvPr>
+          <p:cNvSpPr/>
+          <p:nvPr/>
+        </p:nvSpPr>
+        <p:spPr>
+          <a:xfrm>
+            <a:off x="1187042" y="3754073"/>
+            <a:ext cx="394282" cy="2525086"/>
+          </a:xfrm>
+          <a:prstGeom prst="rect">
+            <a:avLst/>
+          </a:prstGeom>
+          <a:solidFill>
+            <a:schemeClr val="accent6"/>
+          </a:solidFill>
+        </p:spPr>
+        <p:style>
+          <a:lnRef idx="2">
+            <a:schemeClr val="accent1">
+              <a:shade val="50000"/>
+            </a:schemeClr>
+          </a:lnRef>
+          <a:fillRef idx="1">
+            <a:schemeClr val="accent1"/>
+          </a:fillRef>
+          <a:effectRef idx="0">
+            <a:schemeClr val="accent1"/>
+          </a:effectRef>
+          <a:fontRef idx="minor">
+            <a:schemeClr val="lt1"/>
+          </a:fontRef>
+        </p:style>
+        <p:txBody>
+          <a:bodyPr rtlCol="0" anchor="ctr"/>
+          <a:lstStyle/>
+          <a:p>
+            <a:pPr algn="ctr"/>
+            <a:endParaRPr lang="nl-BE"/>
+          </a:p>
+        </p:txBody>
+      </p:sp>
+      <p:sp>
+        <p:nvSpPr>
+          <p:cNvPr id="9" name="Rectangle 8">
+            <a:extLst>
+              <a:ext uri="{FF2B5EF4-FFF2-40B4-BE49-F238E27FC236}">
+                <a16:creationId xmlns:a16="http://schemas.microsoft.com/office/drawing/2014/main" id="{8413FC07-3E19-46AE-A34B-9E261699548C}"/>
+              </a:ext>
+            </a:extLst>
+          </p:cNvPr>
+          <p:cNvSpPr/>
+          <p:nvPr/>
+        </p:nvSpPr>
+        <p:spPr>
+          <a:xfrm>
+            <a:off x="2049711" y="3754073"/>
+            <a:ext cx="394282" cy="2525086"/>
+          </a:xfrm>
+          <a:prstGeom prst="rect">
+            <a:avLst/>
+          </a:prstGeom>
+          <a:solidFill>
+            <a:schemeClr val="accent6"/>
+          </a:solidFill>
+        </p:spPr>
+        <p:style>
+          <a:lnRef idx="2">
+            <a:schemeClr val="accent1">
+              <a:shade val="50000"/>
+            </a:schemeClr>
+          </a:lnRef>
+          <a:fillRef idx="1">
+            <a:schemeClr val="accent1"/>
+          </a:fillRef>
+          <a:effectRef idx="0">
+            <a:schemeClr val="accent1"/>
+          </a:effectRef>
+          <a:fontRef idx="minor">
+            <a:schemeClr val="lt1"/>
+          </a:fontRef>
+        </p:style>
+        <p:txBody>
+          <a:bodyPr rtlCol="0" anchor="ctr"/>
+          <a:lstStyle/>
+          <a:p>
+            <a:pPr algn="ctr"/>
+            <a:endParaRPr lang="nl-BE"/>
+          </a:p>
+        </p:txBody>
+      </p:sp>
+      <p:sp>
+        <p:nvSpPr>
+          <p:cNvPr id="10" name="Rectangle 9">
+            <a:extLst>
+              <a:ext uri="{FF2B5EF4-FFF2-40B4-BE49-F238E27FC236}">
+                <a16:creationId xmlns:a16="http://schemas.microsoft.com/office/drawing/2014/main" id="{493E8640-3937-4122-8A15-5A6FDA251D4B}"/>
+              </a:ext>
+            </a:extLst>
+          </p:cNvPr>
+          <p:cNvSpPr/>
+          <p:nvPr/>
+        </p:nvSpPr>
+        <p:spPr>
+          <a:xfrm>
+            <a:off x="1187042" y="5134063"/>
+            <a:ext cx="394282" cy="1145096"/>
+          </a:xfrm>
+          <a:prstGeom prst="rect">
+            <a:avLst/>
+          </a:prstGeom>
+          <a:solidFill>
+            <a:srgbClr val="FF0000"/>
+          </a:solidFill>
+        </p:spPr>
+        <p:style>
+          <a:lnRef idx="2">
+            <a:schemeClr val="accent1">
+              <a:shade val="50000"/>
+            </a:schemeClr>
+          </a:lnRef>
+          <a:fillRef idx="1">
+            <a:schemeClr val="accent1"/>
+          </a:fillRef>
+          <a:effectRef idx="0">
+            <a:schemeClr val="accent1"/>
+          </a:effectRef>
+          <a:fontRef idx="minor">
+            <a:schemeClr val="lt1"/>
+          </a:fontRef>
+        </p:style>
+        <p:txBody>
+          <a:bodyPr rtlCol="0" anchor="ctr"/>
+          <a:lstStyle/>
+          <a:p>
+            <a:pPr algn="ctr"/>
+            <a:endParaRPr lang="nl-BE" dirty="0"/>
+          </a:p>
+        </p:txBody>
+      </p:sp>
+      <p:sp>
+        <p:nvSpPr>
+          <p:cNvPr id="11" name="Rectangle 10">
+            <a:extLst>
+              <a:ext uri="{FF2B5EF4-FFF2-40B4-BE49-F238E27FC236}">
+                <a16:creationId xmlns:a16="http://schemas.microsoft.com/office/drawing/2014/main" id="{B6F71BE8-DA50-43AC-8176-6A77D14AEA3B}"/>
+              </a:ext>
+            </a:extLst>
+          </p:cNvPr>
+          <p:cNvSpPr/>
+          <p:nvPr/>
+        </p:nvSpPr>
+        <p:spPr>
+          <a:xfrm>
+            <a:off x="2049711" y="4874005"/>
+            <a:ext cx="394282" cy="1405154"/>
+          </a:xfrm>
+          <a:prstGeom prst="rect">
+            <a:avLst/>
+          </a:prstGeom>
+          <a:solidFill>
+            <a:srgbClr val="FF0000"/>
+          </a:solidFill>
+        </p:spPr>
+        <p:style>
+          <a:lnRef idx="2">
+            <a:schemeClr val="accent1">
+              <a:shade val="50000"/>
+            </a:schemeClr>
+          </a:lnRef>
+          <a:fillRef idx="1">
+            <a:schemeClr val="accent1"/>
+          </a:fillRef>
+          <a:effectRef idx="0">
+            <a:schemeClr val="accent1"/>
+          </a:effectRef>
+          <a:fontRef idx="minor">
+            <a:schemeClr val="lt1"/>
+          </a:fontRef>
+        </p:style>
+        <p:txBody>
+          <a:bodyPr rtlCol="0" anchor="ctr"/>
+          <a:lstStyle/>
+          <a:p>
+            <a:pPr algn="ctr"/>
+            <a:endParaRPr lang="nl-BE" dirty="0"/>
+          </a:p>
+        </p:txBody>
+      </p:sp>
+      <p:sp>
+        <p:nvSpPr>
+          <p:cNvPr id="12" name="Rectangle 11">
+            <a:extLst>
+              <a:ext uri="{FF2B5EF4-FFF2-40B4-BE49-F238E27FC236}">
+                <a16:creationId xmlns:a16="http://schemas.microsoft.com/office/drawing/2014/main" id="{BA74FCC4-F252-4264-9A3F-1C7D67732BAA}"/>
+              </a:ext>
+            </a:extLst>
+          </p:cNvPr>
+          <p:cNvSpPr/>
+          <p:nvPr/>
+        </p:nvSpPr>
+        <p:spPr>
+          <a:xfrm>
+            <a:off x="324373" y="5637402"/>
+            <a:ext cx="394282" cy="641756"/>
+          </a:xfrm>
+          <a:prstGeom prst="rect">
+            <a:avLst/>
+          </a:prstGeom>
+          <a:solidFill>
+            <a:srgbClr val="FF0000"/>
+          </a:solidFill>
+        </p:spPr>
+        <p:style>
+          <a:lnRef idx="2">
+            <a:schemeClr val="accent1">
+              <a:shade val="50000"/>
+            </a:schemeClr>
+          </a:lnRef>
+          <a:fillRef idx="1">
+            <a:schemeClr val="accent1"/>
+          </a:fillRef>
+          <a:effectRef idx="0">
+            <a:schemeClr val="accent1"/>
+          </a:effectRef>
+          <a:fontRef idx="minor">
+            <a:schemeClr val="lt1"/>
+          </a:fontRef>
+        </p:style>
+        <p:txBody>
+          <a:bodyPr rtlCol="0" anchor="ctr"/>
+          <a:lstStyle/>
+          <a:p>
+            <a:pPr algn="ctr"/>
+            <a:endParaRPr lang="nl-BE" dirty="0"/>
+          </a:p>
+        </p:txBody>
+      </p:sp>
+      <p:pic>
+        <p:nvPicPr>
+          <p:cNvPr id="14" name="Picture 13">
+            <a:extLst>
+              <a:ext uri="{FF2B5EF4-FFF2-40B4-BE49-F238E27FC236}">
+                <a16:creationId xmlns:a16="http://schemas.microsoft.com/office/drawing/2014/main" id="{85829F4C-96C1-4FD8-9501-756C39E88B07}"/>
+              </a:ext>
+            </a:extLst>
+          </p:cNvPr>
+          <p:cNvPicPr>
+            <a:picLocks noChangeAspect="1"/>
+          </p:cNvPicPr>
+          <p:nvPr/>
+        </p:nvPicPr>
+        <p:blipFill>
+          <a:blip r:embed="rId4">
+            <a:extLst>
+              <a:ext uri="{28A0092B-C50C-407E-A947-70E740481C1C}">
+                <a14:useLocalDpi xmlns:a14="http://schemas.microsoft.com/office/drawing/2010/main" val="0"/>
+              </a:ext>
+            </a:extLst>
+          </a:blip>
+          <a:stretch>
+            <a:fillRect/>
+          </a:stretch>
+        </p:blipFill>
+        <p:spPr>
+          <a:xfrm flipH="1">
+            <a:off x="2105186" y="3421675"/>
+            <a:ext cx="283332" cy="283332"/>
+          </a:xfrm>
+          <a:prstGeom prst="rect">
+            <a:avLst/>
+          </a:prstGeom>
+        </p:spPr>
+      </p:pic>
+      <p:pic>
+        <p:nvPicPr>
+          <p:cNvPr id="16" name="Picture 15">
+            <a:extLst>
+              <a:ext uri="{FF2B5EF4-FFF2-40B4-BE49-F238E27FC236}">
+                <a16:creationId xmlns:a16="http://schemas.microsoft.com/office/drawing/2014/main" id="{B0BA4567-D29E-434B-98F1-3BB648B97E06}"/>
+              </a:ext>
+            </a:extLst>
+          </p:cNvPr>
+          <p:cNvPicPr>
+            <a:picLocks noChangeAspect="1"/>
+          </p:cNvPicPr>
+          <p:nvPr/>
+        </p:nvPicPr>
+        <p:blipFill>
+          <a:blip r:embed="rId5">
+            <a:extLst>
+              <a:ext uri="{28A0092B-C50C-407E-A947-70E740481C1C}">
+                <a14:useLocalDpi xmlns:a14="http://schemas.microsoft.com/office/drawing/2010/main" val="0"/>
+              </a:ext>
+            </a:extLst>
+          </a:blip>
+          <a:stretch>
+            <a:fillRect/>
+          </a:stretch>
+        </p:blipFill>
+        <p:spPr>
+          <a:xfrm>
+            <a:off x="2110531" y="6339463"/>
+            <a:ext cx="272642" cy="272642"/>
+          </a:xfrm>
+          <a:prstGeom prst="rect">
+            <a:avLst/>
+          </a:prstGeom>
+        </p:spPr>
+      </p:pic>
+      <p:graphicFrame>
+        <p:nvGraphicFramePr>
+          <p:cNvPr id="17" name="Object 16">
+            <a:extLst>
+              <a:ext uri="{FF2B5EF4-FFF2-40B4-BE49-F238E27FC236}">
+                <a16:creationId xmlns:a16="http://schemas.microsoft.com/office/drawing/2014/main" id="{EB2672D7-1835-4A87-A5A4-3DC05A56F3F8}"/>
+              </a:ext>
+            </a:extLst>
+          </p:cNvPr>
+          <p:cNvGraphicFramePr>
+            <a:graphicFrameLocks noChangeAspect="1"/>
+          </p:cNvGraphicFramePr>
+          <p:nvPr>
+            <p:extLst>
+              <p:ext uri="{D42A27DB-BD31-4B8C-83A1-F6EECF244321}">
+                <p14:modId xmlns:p14="http://schemas.microsoft.com/office/powerpoint/2010/main" val="2133700009"/>
+              </p:ext>
+            </p:extLst>
+          </p:nvPr>
+        </p:nvGraphicFramePr>
+        <p:xfrm>
+          <a:off x="9277350" y="2357438"/>
+          <a:ext cx="1046163" cy="387350"/>
+        </p:xfrm>
+        <a:graphic>
+          <a:graphicData uri="http://schemas.openxmlformats.org/presentationml/2006/ole">
+            <mc:AlternateContent xmlns:mc="http://schemas.openxmlformats.org/markup-compatibility/2006">
+              <mc:Choice xmlns:v="urn:schemas-microsoft-com:vml" Requires="v">
+                <p:oleObj spid="_x0000_s1029" name="Packager Shell Object" showAsIcon="1" r:id="rId6" imgW="1045800" imgH="387000" progId="Package">
+                  <p:embed/>
+                </p:oleObj>
+              </mc:Choice>
+              <mc:Fallback>
+                <p:oleObj name="Packager Shell Object" showAsIcon="1" r:id="rId6" imgW="1045800" imgH="387000" progId="Package">
+                  <p:embed/>
+                  <p:pic>
+                    <p:nvPicPr>
+                      <p:cNvPr id="0" name=""/>
+                      <p:cNvPicPr/>
+                      <p:nvPr/>
+                    </p:nvPicPr>
+                    <p:blipFill>
+                      <a:blip r:embed="rId7"/>
+                      <a:stretch>
+                        <a:fillRect/>
+                      </a:stretch>
+                    </p:blipFill>
+                    <p:spPr>
+                      <a:xfrm>
+                        <a:off x="9277350" y="2357438"/>
+                        <a:ext cx="1046163" cy="387350"/>
+                      </a:xfrm>
+                      <a:prstGeom prst="rect">
+                        <a:avLst/>
+                      </a:prstGeom>
+                    </p:spPr>
+                  </p:pic>
+                </p:oleObj>
+              </mc:Fallback>
+            </mc:AlternateContent>
+          </a:graphicData>
+        </a:graphic>
+      </p:graphicFrame>
+      <p:pic>
+        <p:nvPicPr>
+          <p:cNvPr id="23" name="Picture 22">
+            <a:extLst>
+              <a:ext uri="{FF2B5EF4-FFF2-40B4-BE49-F238E27FC236}">
+                <a16:creationId xmlns:a16="http://schemas.microsoft.com/office/drawing/2014/main" id="{6DD5537E-48FA-4E2A-9F2E-9C71CB776C8A}"/>
+              </a:ext>
+            </a:extLst>
+          </p:cNvPr>
+          <p:cNvPicPr>
+            <a:picLocks noChangeAspect="1"/>
+          </p:cNvPicPr>
+          <p:nvPr/>
+        </p:nvPicPr>
+        <p:blipFill>
+          <a:blip r:embed="rId8">
+            <a:extLst>
+              <a:ext uri="{28A0092B-C50C-407E-A947-70E740481C1C}">
+                <a14:useLocalDpi xmlns:a14="http://schemas.microsoft.com/office/drawing/2010/main" val="0"/>
+              </a:ext>
+            </a:extLst>
+          </a:blip>
+          <a:stretch>
+            <a:fillRect/>
+          </a:stretch>
+        </p:blipFill>
+        <p:spPr>
+          <a:xfrm>
+            <a:off x="1298444" y="3470514"/>
+            <a:ext cx="285226" cy="285226"/>
+          </a:xfrm>
+          <a:prstGeom prst="rect">
+            <a:avLst/>
+          </a:prstGeom>
+        </p:spPr>
+      </p:pic>
+      <p:pic>
+        <p:nvPicPr>
+          <p:cNvPr id="25" name="Picture 24">
+            <a:extLst>
+              <a:ext uri="{FF2B5EF4-FFF2-40B4-BE49-F238E27FC236}">
+                <a16:creationId xmlns:a16="http://schemas.microsoft.com/office/drawing/2014/main" id="{BD353F45-1B37-476E-8B45-2C9E2221A349}"/>
+              </a:ext>
+            </a:extLst>
+          </p:cNvPr>
+          <p:cNvPicPr>
+            <a:picLocks noChangeAspect="1"/>
+          </p:cNvPicPr>
+          <p:nvPr/>
+        </p:nvPicPr>
+        <p:blipFill>
+          <a:blip r:embed="rId9">
+            <a:extLst>
+              <a:ext uri="{28A0092B-C50C-407E-A947-70E740481C1C}">
+                <a14:useLocalDpi xmlns:a14="http://schemas.microsoft.com/office/drawing/2010/main" val="0"/>
+              </a:ext>
+            </a:extLst>
+          </a:blip>
+          <a:stretch>
+            <a:fillRect/>
+          </a:stretch>
+        </p:blipFill>
+        <p:spPr>
+          <a:xfrm>
+            <a:off x="1247862" y="6342905"/>
+            <a:ext cx="272642" cy="272642"/>
+          </a:xfrm>
+          <a:prstGeom prst="rect">
+            <a:avLst/>
+          </a:prstGeom>
+        </p:spPr>
+      </p:pic>
+      <p:pic>
+        <p:nvPicPr>
+          <p:cNvPr id="27" name="Picture 26">
+            <a:extLst>
+              <a:ext uri="{FF2B5EF4-FFF2-40B4-BE49-F238E27FC236}">
+                <a16:creationId xmlns:a16="http://schemas.microsoft.com/office/drawing/2014/main" id="{7016412C-7070-4B28-BA3E-828E36287C88}"/>
+              </a:ext>
+            </a:extLst>
+          </p:cNvPr>
+          <p:cNvPicPr>
+            <a:picLocks noChangeAspect="1"/>
+          </p:cNvPicPr>
+          <p:nvPr/>
+        </p:nvPicPr>
+        <p:blipFill>
+          <a:blip r:embed="rId10">
+            <a:extLst>
+              <a:ext uri="{28A0092B-C50C-407E-A947-70E740481C1C}">
+                <a14:useLocalDpi xmlns:a14="http://schemas.microsoft.com/office/drawing/2010/main" val="0"/>
+              </a:ext>
+            </a:extLst>
+          </a:blip>
+          <a:stretch>
+            <a:fillRect/>
+          </a:stretch>
+        </p:blipFill>
+        <p:spPr>
+          <a:xfrm>
+            <a:off x="281062" y="6220033"/>
+            <a:ext cx="480904" cy="480904"/>
+          </a:xfrm>
+          <a:prstGeom prst="rect">
+            <a:avLst/>
+          </a:prstGeom>
+        </p:spPr>
+      </p:pic>
+      <p:pic>
+        <p:nvPicPr>
+          <p:cNvPr id="29" name="Picture 28">
+            <a:extLst>
+              <a:ext uri="{FF2B5EF4-FFF2-40B4-BE49-F238E27FC236}">
+                <a16:creationId xmlns:a16="http://schemas.microsoft.com/office/drawing/2014/main" id="{C8D4E6EB-0507-47D3-B4E6-80DC7F157D1C}"/>
+              </a:ext>
+            </a:extLst>
+          </p:cNvPr>
+          <p:cNvPicPr>
+            <a:picLocks noChangeAspect="1"/>
+          </p:cNvPicPr>
+          <p:nvPr/>
+        </p:nvPicPr>
+        <p:blipFill>
+          <a:blip r:embed="rId11">
+            <a:extLst>
+              <a:ext uri="{28A0092B-C50C-407E-A947-70E740481C1C}">
+                <a14:useLocalDpi xmlns:a14="http://schemas.microsoft.com/office/drawing/2010/main" val="0"/>
+              </a:ext>
+            </a:extLst>
+          </a:blip>
+          <a:stretch>
+            <a:fillRect/>
+          </a:stretch>
+        </p:blipFill>
+        <p:spPr>
+          <a:xfrm>
+            <a:off x="279566" y="3332296"/>
+            <a:ext cx="482400" cy="482400"/>
+          </a:xfrm>
+          <a:prstGeom prst="rect">
+            <a:avLst/>
+          </a:prstGeom>
+        </p:spPr>
+      </p:pic>
+      <p:sp>
+        <p:nvSpPr>
+          <p:cNvPr id="30" name="Rectangle 29">
+            <a:extLst>
+              <a:ext uri="{FF2B5EF4-FFF2-40B4-BE49-F238E27FC236}">
+                <a16:creationId xmlns:a16="http://schemas.microsoft.com/office/drawing/2014/main" id="{D2B21E72-0CE9-49F0-B023-2AF9B4DC7B29}"/>
+              </a:ext>
+            </a:extLst>
+          </p:cNvPr>
+          <p:cNvSpPr/>
+          <p:nvPr/>
+        </p:nvSpPr>
+        <p:spPr>
+          <a:xfrm>
+            <a:off x="3130928" y="5536476"/>
+            <a:ext cx="5930143" cy="1035523"/>
+          </a:xfrm>
+          <a:prstGeom prst="rect">
+            <a:avLst/>
+          </a:prstGeom>
+          <a:ln>
+            <a:solidFill>
+              <a:schemeClr val="tx1"/>
+            </a:solidFill>
+          </a:ln>
+        </p:spPr>
+        <p:style>
+          <a:lnRef idx="2">
+            <a:schemeClr val="accent1">
+              <a:shade val="50000"/>
+            </a:schemeClr>
+          </a:lnRef>
+          <a:fillRef idx="1">
+            <a:schemeClr val="accent1"/>
+          </a:fillRef>
+          <a:effectRef idx="0">
+            <a:schemeClr val="accent1"/>
+          </a:effectRef>
+          <a:fontRef idx="minor">
+            <a:schemeClr val="lt1"/>
+          </a:fontRef>
+        </p:style>
+        <p:txBody>
+          <a:bodyPr rtlCol="0" anchor="ctr"/>
+          <a:lstStyle/>
+          <a:p>
+            <a:pPr algn="ctr"/>
+            <a:endParaRPr lang="nl-BE"/>
+          </a:p>
+        </p:txBody>
+      </p:sp>
+      <p:sp>
+        <p:nvSpPr>
+          <p:cNvPr id="31" name="Rectangle 30">
+            <a:extLst>
+              <a:ext uri="{FF2B5EF4-FFF2-40B4-BE49-F238E27FC236}">
+                <a16:creationId xmlns:a16="http://schemas.microsoft.com/office/drawing/2014/main" id="{2186892A-ECB0-4219-9829-27A110F5B8C8}"/>
+              </a:ext>
+            </a:extLst>
+          </p:cNvPr>
+          <p:cNvSpPr/>
+          <p:nvPr/>
+        </p:nvSpPr>
+        <p:spPr>
+          <a:xfrm>
+            <a:off x="5716730" y="5656808"/>
+            <a:ext cx="758538" cy="794857"/>
+          </a:xfrm>
+          <a:prstGeom prst="rect">
+            <a:avLst/>
+          </a:prstGeom>
+        </p:spPr>
+        <p:style>
+          <a:lnRef idx="2">
+            <a:schemeClr val="accent1">
+              <a:shade val="50000"/>
+            </a:schemeClr>
+          </a:lnRef>
+          <a:fillRef idx="1">
+            <a:schemeClr val="accent1"/>
+          </a:fillRef>
+          <a:effectRef idx="0">
+            <a:schemeClr val="accent1"/>
+          </a:effectRef>
+          <a:fontRef idx="minor">
+            <a:schemeClr val="lt1"/>
+          </a:fontRef>
+        </p:style>
+        <p:txBody>
+          <a:bodyPr rtlCol="0" anchor="ctr"/>
+          <a:lstStyle/>
+          <a:p>
+            <a:pPr algn="ctr"/>
+            <a:endParaRPr lang="nl-BE"/>
+          </a:p>
+        </p:txBody>
+      </p:sp>
+      <p:sp>
+        <p:nvSpPr>
+          <p:cNvPr id="32" name="Rectangle 31">
+            <a:extLst>
+              <a:ext uri="{FF2B5EF4-FFF2-40B4-BE49-F238E27FC236}">
+                <a16:creationId xmlns:a16="http://schemas.microsoft.com/office/drawing/2014/main" id="{34A15599-39E0-4052-9D73-596ABAE73A30}"/>
+              </a:ext>
+            </a:extLst>
+          </p:cNvPr>
+          <p:cNvSpPr/>
+          <p:nvPr/>
+        </p:nvSpPr>
+        <p:spPr>
+          <a:xfrm>
+            <a:off x="8016562" y="5665628"/>
+            <a:ext cx="758538" cy="794857"/>
+          </a:xfrm>
+          <a:prstGeom prst="rect">
+            <a:avLst/>
+          </a:prstGeom>
+        </p:spPr>
+        <p:style>
+          <a:lnRef idx="2">
+            <a:schemeClr val="accent1">
+              <a:shade val="50000"/>
+            </a:schemeClr>
+          </a:lnRef>
+          <a:fillRef idx="1">
+            <a:schemeClr val="accent1"/>
+          </a:fillRef>
+          <a:effectRef idx="0">
+            <a:schemeClr val="accent1"/>
+          </a:effectRef>
+          <a:fontRef idx="minor">
+            <a:schemeClr val="lt1"/>
+          </a:fontRef>
+        </p:style>
+        <p:txBody>
+          <a:bodyPr rtlCol="0" anchor="ctr"/>
+          <a:lstStyle/>
+          <a:p>
+            <a:pPr algn="ctr"/>
+            <a:endParaRPr lang="nl-BE"/>
+          </a:p>
+        </p:txBody>
+      </p:sp>
+      <p:sp>
+        <p:nvSpPr>
+          <p:cNvPr id="33" name="Rectangle 32">
+            <a:extLst>
+              <a:ext uri="{FF2B5EF4-FFF2-40B4-BE49-F238E27FC236}">
+                <a16:creationId xmlns:a16="http://schemas.microsoft.com/office/drawing/2014/main" id="{DC2D361B-0836-4BEF-8140-6BCAF4432837}"/>
+              </a:ext>
+            </a:extLst>
+          </p:cNvPr>
+          <p:cNvSpPr/>
+          <p:nvPr/>
+        </p:nvSpPr>
+        <p:spPr>
+          <a:xfrm>
+            <a:off x="6972053" y="5643307"/>
+            <a:ext cx="758538" cy="794857"/>
+          </a:xfrm>
+          <a:prstGeom prst="rect">
+            <a:avLst/>
+          </a:prstGeom>
+        </p:spPr>
+        <p:style>
+          <a:lnRef idx="2">
+            <a:schemeClr val="accent1">
+              <a:shade val="50000"/>
+            </a:schemeClr>
+          </a:lnRef>
+          <a:fillRef idx="1">
+            <a:schemeClr val="accent1"/>
+          </a:fillRef>
+          <a:effectRef idx="0">
+            <a:schemeClr val="accent1"/>
+          </a:effectRef>
+          <a:fontRef idx="minor">
+            <a:schemeClr val="lt1"/>
+          </a:fontRef>
+        </p:style>
+        <p:txBody>
+          <a:bodyPr rtlCol="0" anchor="ctr"/>
+          <a:lstStyle/>
+          <a:p>
+            <a:pPr algn="ctr"/>
+            <a:endParaRPr lang="nl-BE"/>
+          </a:p>
+        </p:txBody>
+      </p:sp>
+      <p:sp>
+        <p:nvSpPr>
+          <p:cNvPr id="34" name="Rectangle 33">
+            <a:extLst>
+              <a:ext uri="{FF2B5EF4-FFF2-40B4-BE49-F238E27FC236}">
+                <a16:creationId xmlns:a16="http://schemas.microsoft.com/office/drawing/2014/main" id="{98F4C6DD-0E16-4DDF-A8A8-355D0EF433CA}"/>
+              </a:ext>
+            </a:extLst>
+          </p:cNvPr>
+          <p:cNvSpPr/>
+          <p:nvPr/>
+        </p:nvSpPr>
+        <p:spPr>
+          <a:xfrm>
+            <a:off x="3286022" y="5647888"/>
+            <a:ext cx="758538" cy="794857"/>
+          </a:xfrm>
+          <a:prstGeom prst="rect">
+            <a:avLst/>
+          </a:prstGeom>
+        </p:spPr>
+        <p:style>
+          <a:lnRef idx="2">
+            <a:schemeClr val="accent1">
+              <a:shade val="50000"/>
+            </a:schemeClr>
+          </a:lnRef>
+          <a:fillRef idx="1">
+            <a:schemeClr val="accent1"/>
+          </a:fillRef>
+          <a:effectRef idx="0">
+            <a:schemeClr val="accent1"/>
+          </a:effectRef>
+          <a:fontRef idx="minor">
+            <a:schemeClr val="lt1"/>
+          </a:fontRef>
+        </p:style>
+        <p:txBody>
+          <a:bodyPr rtlCol="0" anchor="ctr"/>
+          <a:lstStyle/>
+          <a:p>
+            <a:pPr algn="ctr"/>
+            <a:endParaRPr lang="nl-BE"/>
+          </a:p>
+        </p:txBody>
+      </p:sp>
+      <p:sp>
+        <p:nvSpPr>
+          <p:cNvPr id="35" name="Rectangle 34">
+            <a:extLst>
+              <a:ext uri="{FF2B5EF4-FFF2-40B4-BE49-F238E27FC236}">
+                <a16:creationId xmlns:a16="http://schemas.microsoft.com/office/drawing/2014/main" id="{1F412782-72D6-4086-9CB3-67DCBBCD4C70}"/>
+              </a:ext>
+            </a:extLst>
+          </p:cNvPr>
+          <p:cNvSpPr/>
+          <p:nvPr/>
+        </p:nvSpPr>
+        <p:spPr>
+          <a:xfrm>
+            <a:off x="4514179" y="5665628"/>
+            <a:ext cx="758538" cy="794857"/>
+          </a:xfrm>
+          <a:prstGeom prst="rect">
+            <a:avLst/>
+          </a:prstGeom>
+        </p:spPr>
+        <p:style>
+          <a:lnRef idx="2">
+            <a:schemeClr val="accent1">
+              <a:shade val="50000"/>
+            </a:schemeClr>
+          </a:lnRef>
+          <a:fillRef idx="1">
+            <a:schemeClr val="accent1"/>
+          </a:fillRef>
+          <a:effectRef idx="0">
+            <a:schemeClr val="accent1"/>
+          </a:effectRef>
+          <a:fontRef idx="minor">
+            <a:schemeClr val="lt1"/>
+          </a:fontRef>
+        </p:style>
+        <p:txBody>
+          <a:bodyPr rtlCol="0" anchor="ctr"/>
+          <a:lstStyle/>
+          <a:p>
+            <a:pPr algn="ctr"/>
+            <a:endParaRPr lang="nl-BE"/>
           </a:p>
         </p:txBody>
       </p:sp>

</xml_diff>